<commit_message>
update task 7 explenations
</commit_message>
<xml_diff>
--- a/exercises/exe1/הסברים בנוגע לתרגיל 1 -  Big Data.pptx
+++ b/exercises/exe1/הסברים בנוגע לתרגיל 1 -  Big Data.pptx
@@ -6125,8 +6125,8 @@
         </p:nvSpPr>
         <p:spPr>
           <a:xfrm>
-            <a:off x="899592" y="2204864"/>
-            <a:ext cx="7776864" cy="369332"/>
+            <a:off x="539552" y="2204864"/>
+            <a:ext cx="8352928" cy="3693319"/>
           </a:xfrm>
           <a:prstGeom prst="rect">
             <a:avLst/>
@@ -6140,6 +6140,67 @@
           <a:lstStyle/>
           <a:p>
             <a:r>
+              <a:rPr lang="he-IL" dirty="0" smtClean="0"/>
+              <a:t>המרה של </a:t>
+            </a:r>
+            <a:r>
+              <a:rPr lang="en-US" dirty="0" smtClean="0"/>
+              <a:t>timestamp</a:t>
+            </a:r>
+            <a:r>
+              <a:rPr lang="he-IL" dirty="0" smtClean="0"/>
+              <a:t> לאובייקט </a:t>
+            </a:r>
+            <a:r>
+              <a:rPr lang="en-US" dirty="0" err="1" smtClean="0"/>
+              <a:t>datetime</a:t>
+            </a:r>
+            <a:r>
+              <a:rPr lang="he-IL" dirty="0" smtClean="0"/>
+              <a:t>:</a:t>
+            </a:r>
+          </a:p>
+          <a:p>
+            <a:r>
+              <a:rPr lang="en-US" dirty="0" err="1"/>
+              <a:t>datetime.fromtimestamp</a:t>
+            </a:r>
+            <a:r>
+              <a:rPr lang="en-US" dirty="0"/>
+              <a:t>(float(timestamp))</a:t>
+            </a:r>
+          </a:p>
+          <a:p>
+            <a:endParaRPr lang="he-IL" dirty="0" smtClean="0"/>
+          </a:p>
+          <a:p>
+            <a:r>
+              <a:rPr lang="he-IL" dirty="0" smtClean="0"/>
+              <a:t>מהאובייקט </a:t>
+            </a:r>
+            <a:r>
+              <a:rPr lang="en-US" dirty="0" err="1" smtClean="0"/>
+              <a:t>datetime</a:t>
+            </a:r>
+            <a:r>
+              <a:rPr lang="he-IL" dirty="0" smtClean="0"/>
+              <a:t> ניתן לגשת למאפיינים: </a:t>
+            </a:r>
+            <a:r>
+              <a:rPr lang="en-US" dirty="0"/>
+              <a:t>year, month, day, </a:t>
+            </a:r>
+            <a:r>
+              <a:rPr lang="en-US" dirty="0" smtClean="0"/>
+              <a:t>hour</a:t>
+            </a:r>
+            <a:endParaRPr lang="he-IL" dirty="0" smtClean="0"/>
+          </a:p>
+          <a:p>
+            <a:endParaRPr lang="he-IL" dirty="0"/>
+          </a:p>
+          <a:p>
+            <a:r>
               <a:rPr lang="en-US" dirty="0" err="1"/>
               <a:t>Rdd</a:t>
             </a:r>
@@ -6147,6 +6208,129 @@
               <a:rPr lang="en-US" dirty="0"/>
               <a:t> mapping</a:t>
             </a:r>
+            <a:endParaRPr lang="he-IL" dirty="0"/>
+          </a:p>
+          <a:p>
+            <a:r>
+              <a:rPr lang="he-IL" dirty="0"/>
+              <a:t>ה- </a:t>
+            </a:r>
+            <a:r>
+              <a:rPr lang="en-US" dirty="0"/>
+              <a:t>dataset</a:t>
+            </a:r>
+            <a:r>
+              <a:rPr lang="he-IL" dirty="0"/>
+              <a:t> המקורי הכיל 10 עמודות</a:t>
+            </a:r>
+            <a:r>
+              <a:rPr lang="he-IL" dirty="0" smtClean="0"/>
+              <a:t>.</a:t>
+            </a:r>
+          </a:p>
+          <a:p>
+            <a:endParaRPr lang="he-IL" dirty="0"/>
+          </a:p>
+          <a:p>
+            <a:r>
+              <a:rPr lang="he-IL" dirty="0" smtClean="0"/>
+              <a:t>הטרנספורמציה:</a:t>
+            </a:r>
+          </a:p>
+          <a:p>
+            <a:r>
+              <a:rPr lang="he-IL" dirty="0" smtClean="0"/>
+              <a:t>כל שורה </a:t>
+            </a:r>
+            <a:r>
+              <a:rPr lang="en-US" dirty="0" smtClean="0"/>
+              <a:t>x</a:t>
+            </a:r>
+            <a:r>
+              <a:rPr lang="he-IL" dirty="0" smtClean="0"/>
+              <a:t> ב- </a:t>
+            </a:r>
+            <a:r>
+              <a:rPr lang="en-US" dirty="0" err="1" smtClean="0"/>
+              <a:t>rdd</a:t>
+            </a:r>
+            <a:r>
+              <a:rPr lang="he-IL" dirty="0" smtClean="0"/>
+              <a:t> ממופת לשורה הבאה:</a:t>
+            </a:r>
+          </a:p>
+          <a:p>
+            <a:r>
+              <a:rPr lang="en-US" dirty="0"/>
+              <a:t>x[0], x[1], x[2], x[3], x[4], x[5], x[6], </a:t>
+            </a:r>
+            <a:r>
+              <a:rPr lang="en-US" dirty="0" err="1"/>
+              <a:t>t.year</a:t>
+            </a:r>
+            <a:r>
+              <a:rPr lang="en-US" dirty="0"/>
+              <a:t>, </a:t>
+            </a:r>
+            <a:r>
+              <a:rPr lang="en-US" dirty="0" err="1"/>
+              <a:t>t.month</a:t>
+            </a:r>
+            <a:r>
+              <a:rPr lang="en-US" dirty="0"/>
+              <a:t>, </a:t>
+            </a:r>
+            <a:r>
+              <a:rPr lang="en-US" dirty="0" err="1"/>
+              <a:t>t.day</a:t>
+            </a:r>
+            <a:r>
+              <a:rPr lang="en-US" dirty="0"/>
+              <a:t>, </a:t>
+            </a:r>
+            <a:r>
+              <a:rPr lang="en-US" dirty="0" err="1"/>
+              <a:t>t.hour</a:t>
+            </a:r>
+            <a:r>
+              <a:rPr lang="en-US" dirty="0"/>
+              <a:t>, x[8], x[9]</a:t>
+            </a:r>
+            <a:endParaRPr lang="he-IL" dirty="0"/>
+          </a:p>
+          <a:p>
+            <a:r>
+              <a:rPr lang="he-IL" dirty="0"/>
+              <a:t>לאחר ביצוע טרנספורמצית המיפוי, העמודה </a:t>
+            </a:r>
+            <a:r>
+              <a:rPr lang="en-US" dirty="0"/>
+              <a:t>timestamp</a:t>
+            </a:r>
+            <a:r>
+              <a:rPr lang="he-IL" dirty="0"/>
+              <a:t> הוחלפה ב- </a:t>
+            </a:r>
+            <a:r>
+              <a:rPr lang="en-US" dirty="0"/>
+              <a:t>year, month, day, </a:t>
+            </a:r>
+            <a:r>
+              <a:rPr lang="en-US" dirty="0" smtClean="0"/>
+              <a:t>hour</a:t>
+            </a:r>
+            <a:endParaRPr lang="he-IL" dirty="0" smtClean="0"/>
+          </a:p>
+          <a:p>
+            <a:r>
+              <a:rPr lang="he-IL" dirty="0" smtClean="0"/>
+              <a:t>ולכן קיימות 13 עמודות ב- </a:t>
+            </a:r>
+            <a:r>
+              <a:rPr lang="en-US" dirty="0" smtClean="0"/>
+              <a:t>dataset</a:t>
+            </a:r>
+            <a:endParaRPr lang="he-IL" dirty="0"/>
           </a:p>
         </p:txBody>
       </p:sp>
@@ -9532,8 +9716,8 @@
           </a:p>
         </p:txBody>
       </p:sp>
-      <mc:AlternateContent xmlns:mc="http://schemas.openxmlformats.org/markup-compatibility/2006">
-        <mc:Choice xmlns:a14="http://schemas.microsoft.com/office/drawing/2010/main" Requires="a14">
+      <mc:AlternateContent xmlns:mc="http://schemas.openxmlformats.org/markup-compatibility/2006" xmlns:a14="http://schemas.microsoft.com/office/drawing/2010/main">
+        <mc:Choice Requires="a14">
           <p:sp>
             <p:nvSpPr>
               <p:cNvPr id="7" name="TextBox 6"/>
@@ -9563,6 +9747,7 @@
                 <a:endParaRPr lang="en-US" dirty="0"/>
               </a:p>
               <a:p>
+                <a:pPr/>
                 <a14:m>
                   <m:oMathPara xmlns:m="http://schemas.openxmlformats.org/officeDocument/2006/math">
                     <m:oMathParaPr>
@@ -9570,11 +9755,15 @@
                     </m:oMathParaPr>
                     <m:oMath xmlns:m="http://schemas.openxmlformats.org/officeDocument/2006/math">
                       <m:r>
-                        <a:rPr lang="en-US" i="1"/>
+                        <a:rPr lang="en-US" i="1">
+                          <a:latin typeface="Cambria Math"/>
+                        </a:rPr>
                         <m:t>𝑀</m:t>
                       </m:r>
                       <m:r>
-                        <a:rPr lang="en-US" i="1"/>
+                        <a:rPr lang="en-US" i="1">
+                          <a:latin typeface="Cambria Math"/>
+                        </a:rPr>
                         <m:t>=</m:t>
                       </m:r>
                       <m:d>
@@ -9582,7 +9771,9 @@
                           <m:begChr m:val="["/>
                           <m:endChr m:val="]"/>
                           <m:ctrlPr>
-                            <a:rPr lang="en-US" i="1"/>
+                            <a:rPr lang="en-US" i="1">
+                              <a:latin typeface="Cambria Math"/>
+                            </a:rPr>
                           </m:ctrlPr>
                         </m:dPr>
                         <m:e>
@@ -9597,31 +9788,41 @@
                                 </m:mc>
                               </m:mcs>
                               <m:ctrlPr>
-                                <a:rPr lang="en-US" i="1"/>
+                                <a:rPr lang="en-US" i="1">
+                                  <a:latin typeface="Cambria Math"/>
+                                </a:rPr>
                               </m:ctrlPr>
                             </m:mPr>
                             <m:mr>
                               <m:e>
                                 <m:r>
-                                  <a:rPr lang="en-US" i="1"/>
+                                  <a:rPr lang="en-US" i="1">
+                                    <a:latin typeface="Cambria Math"/>
+                                  </a:rPr>
                                   <m:t>0</m:t>
                                 </m:r>
                               </m:e>
                               <m:e>
                                 <m:r>
-                                  <a:rPr lang="en-US" i="1"/>
+                                  <a:rPr lang="en-US" i="1">
+                                    <a:latin typeface="Cambria Math"/>
+                                  </a:rPr>
                                   <m:t>0</m:t>
                                 </m:r>
                               </m:e>
                               <m:e>
                                 <m:r>
-                                  <a:rPr lang="en-US" i="1"/>
+                                  <a:rPr lang="en-US" i="1">
+                                    <a:latin typeface="Cambria Math"/>
+                                  </a:rPr>
                                   <m:t>0</m:t>
                                 </m:r>
                               </m:e>
                               <m:e>
                                 <m:r>
-                                  <a:rPr lang="en-US" i="1"/>
+                                  <a:rPr lang="en-US" i="1">
+                                    <a:latin typeface="Cambria Math"/>
+                                  </a:rPr>
                                   <m:t>0</m:t>
                                 </m:r>
                               </m:e>
@@ -9629,25 +9830,33 @@
                             <m:mr>
                               <m:e>
                                 <m:r>
-                                  <a:rPr lang="en-US" i="1"/>
+                                  <a:rPr lang="en-US" i="1">
+                                    <a:latin typeface="Cambria Math"/>
+                                  </a:rPr>
                                   <m:t>5</m:t>
                                 </m:r>
                               </m:e>
                               <m:e>
                                 <m:r>
-                                  <a:rPr lang="en-US" i="1"/>
+                                  <a:rPr lang="en-US" i="1">
+                                    <a:latin typeface="Cambria Math"/>
+                                  </a:rPr>
                                   <m:t>8</m:t>
                                 </m:r>
                               </m:e>
                               <m:e>
                                 <m:r>
-                                  <a:rPr lang="en-US" i="1"/>
+                                  <a:rPr lang="en-US" i="1">
+                                    <a:latin typeface="Cambria Math"/>
+                                  </a:rPr>
                                   <m:t>0</m:t>
                                 </m:r>
                               </m:e>
                               <m:e>
                                 <m:r>
-                                  <a:rPr lang="en-US" i="1"/>
+                                  <a:rPr lang="en-US" i="1">
+                                    <a:latin typeface="Cambria Math"/>
+                                  </a:rPr>
                                   <m:t>0</m:t>
                                 </m:r>
                               </m:e>
@@ -9655,25 +9864,33 @@
                             <m:mr>
                               <m:e>
                                 <m:r>
-                                  <a:rPr lang="en-US" i="1"/>
+                                  <a:rPr lang="en-US" i="1">
+                                    <a:latin typeface="Cambria Math"/>
+                                  </a:rPr>
                                   <m:t>0</m:t>
                                 </m:r>
                               </m:e>
                               <m:e>
                                 <m:r>
-                                  <a:rPr lang="en-US" i="1"/>
+                                  <a:rPr lang="en-US" i="1">
+                                    <a:latin typeface="Cambria Math"/>
+                                  </a:rPr>
                                   <m:t>0</m:t>
                                 </m:r>
                               </m:e>
                               <m:e>
                                 <m:r>
-                                  <a:rPr lang="en-US" i="1"/>
+                                  <a:rPr lang="en-US" i="1">
+                                    <a:latin typeface="Cambria Math"/>
+                                  </a:rPr>
                                   <m:t>3</m:t>
                                 </m:r>
                               </m:e>
                               <m:e>
                                 <m:r>
-                                  <a:rPr lang="en-US" i="1"/>
+                                  <a:rPr lang="en-US" i="1">
+                                    <a:latin typeface="Cambria Math"/>
+                                  </a:rPr>
                                   <m:t>0</m:t>
                                 </m:r>
                               </m:e>
@@ -9681,25 +9898,33 @@
                             <m:mr>
                               <m:e>
                                 <m:r>
-                                  <a:rPr lang="en-US" i="1"/>
+                                  <a:rPr lang="en-US" i="1">
+                                    <a:latin typeface="Cambria Math"/>
+                                  </a:rPr>
                                   <m:t>0</m:t>
                                 </m:r>
                               </m:e>
                               <m:e>
                                 <m:r>
-                                  <a:rPr lang="en-US" i="1"/>
+                                  <a:rPr lang="en-US" i="1">
+                                    <a:latin typeface="Cambria Math"/>
+                                  </a:rPr>
                                   <m:t>6</m:t>
                                 </m:r>
                               </m:e>
                               <m:e>
                                 <m:r>
-                                  <a:rPr lang="en-US" i="1"/>
+                                  <a:rPr lang="en-US" i="1">
+                                    <a:latin typeface="Cambria Math"/>
+                                  </a:rPr>
                                   <m:t>0</m:t>
                                 </m:r>
                               </m:e>
                               <m:e>
                                 <m:r>
-                                  <a:rPr lang="en-US" i="1"/>
+                                  <a:rPr lang="en-US" i="1">
+                                    <a:latin typeface="Cambria Math"/>
+                                  </a:rPr>
                                   <m:t>0</m:t>
                                 </m:r>
                               </m:e>
@@ -9782,7 +10007,7 @@
             </p:txBody>
           </p:sp>
         </mc:Choice>
-        <mc:Fallback>
+        <mc:Fallback xmlns="">
           <p:sp>
             <p:nvSpPr>
               <p:cNvPr id="7" name="TextBox 6"/>
@@ -9992,8 +10217,8 @@
           </a:p>
         </p:txBody>
       </p:sp>
-      <mc:AlternateContent xmlns:mc="http://schemas.openxmlformats.org/markup-compatibility/2006">
-        <mc:Choice xmlns:a14="http://schemas.microsoft.com/office/drawing/2010/main" Requires="a14">
+      <mc:AlternateContent xmlns:mc="http://schemas.openxmlformats.org/markup-compatibility/2006" xmlns:a14="http://schemas.microsoft.com/office/drawing/2010/main">
+        <mc:Choice Requires="a14">
           <p:sp>
             <p:nvSpPr>
               <p:cNvPr id="7" name="TextBox 6"/>
@@ -10023,6 +10248,7 @@
                 <a:endParaRPr lang="en-US" dirty="0"/>
               </a:p>
               <a:p>
+                <a:pPr/>
                 <a14:m>
                   <m:oMathPara xmlns:m="http://schemas.openxmlformats.org/officeDocument/2006/math">
                     <m:oMathParaPr>
@@ -10030,11 +10256,15 @@
                     </m:oMathParaPr>
                     <m:oMath xmlns:m="http://schemas.openxmlformats.org/officeDocument/2006/math">
                       <m:r>
-                        <a:rPr lang="en-US" i="1"/>
+                        <a:rPr lang="en-US" i="1">
+                          <a:latin typeface="Cambria Math"/>
+                        </a:rPr>
                         <m:t>𝑀</m:t>
                       </m:r>
                       <m:r>
-                        <a:rPr lang="en-US" i="1"/>
+                        <a:rPr lang="en-US" i="1">
+                          <a:latin typeface="Cambria Math"/>
+                        </a:rPr>
                         <m:t>=</m:t>
                       </m:r>
                       <m:d>
@@ -10042,7 +10272,9 @@
                           <m:begChr m:val="["/>
                           <m:endChr m:val="]"/>
                           <m:ctrlPr>
-                            <a:rPr lang="en-US" i="1"/>
+                            <a:rPr lang="en-US" i="1">
+                              <a:latin typeface="Cambria Math"/>
+                            </a:rPr>
                           </m:ctrlPr>
                         </m:dPr>
                         <m:e>
@@ -10057,43 +10289,57 @@
                                 </m:mc>
                               </m:mcs>
                               <m:ctrlPr>
-                                <a:rPr lang="en-US" i="1"/>
+                                <a:rPr lang="en-US" i="1">
+                                  <a:latin typeface="Cambria Math"/>
+                                </a:rPr>
                               </m:ctrlPr>
                             </m:mPr>
                             <m:mr>
                               <m:e>
                                 <m:r>
-                                  <a:rPr lang="en-US" i="1"/>
+                                  <a:rPr lang="en-US" i="1">
+                                    <a:latin typeface="Cambria Math"/>
+                                  </a:rPr>
                                   <m:t>10</m:t>
                                 </m:r>
                               </m:e>
                               <m:e>
                                 <m:r>
-                                  <a:rPr lang="en-US" i="1"/>
+                                  <a:rPr lang="en-US" i="1">
+                                    <a:latin typeface="Cambria Math"/>
+                                  </a:rPr>
                                   <m:t>20</m:t>
                                 </m:r>
                               </m:e>
                               <m:e>
                                 <m:r>
-                                  <a:rPr lang="en-US" i="1"/>
+                                  <a:rPr lang="en-US" i="1">
+                                    <a:latin typeface="Cambria Math"/>
+                                  </a:rPr>
                                   <m:t>0</m:t>
                                 </m:r>
                               </m:e>
                               <m:e>
                                 <m:r>
-                                  <a:rPr lang="en-US" i="1"/>
+                                  <a:rPr lang="en-US" i="1">
+                                    <a:latin typeface="Cambria Math"/>
+                                  </a:rPr>
                                   <m:t>0</m:t>
                                 </m:r>
                               </m:e>
                               <m:e>
                                 <m:r>
-                                  <a:rPr lang="en-US" i="1"/>
+                                  <a:rPr lang="en-US" i="1">
+                                    <a:latin typeface="Cambria Math"/>
+                                  </a:rPr>
                                   <m:t>0</m:t>
                                 </m:r>
                               </m:e>
                               <m:e>
                                 <m:r>
-                                  <a:rPr lang="en-US" i="1"/>
+                                  <a:rPr lang="en-US" i="1">
+                                    <a:latin typeface="Cambria Math"/>
+                                  </a:rPr>
                                   <m:t>0</m:t>
                                 </m:r>
                               </m:e>
@@ -10101,37 +10347,49 @@
                             <m:mr>
                               <m:e>
                                 <m:r>
-                                  <a:rPr lang="en-US" i="1"/>
+                                  <a:rPr lang="en-US" i="1">
+                                    <a:latin typeface="Cambria Math"/>
+                                  </a:rPr>
                                   <m:t>0</m:t>
                                 </m:r>
                               </m:e>
                               <m:e>
                                 <m:r>
-                                  <a:rPr lang="en-US" i="1"/>
+                                  <a:rPr lang="en-US" i="1">
+                                    <a:latin typeface="Cambria Math"/>
+                                  </a:rPr>
                                   <m:t>30</m:t>
                                 </m:r>
                               </m:e>
                               <m:e>
                                 <m:r>
-                                  <a:rPr lang="en-US" i="1"/>
+                                  <a:rPr lang="en-US" i="1">
+                                    <a:latin typeface="Cambria Math"/>
+                                  </a:rPr>
                                   <m:t>0</m:t>
                                 </m:r>
                               </m:e>
                               <m:e>
                                 <m:r>
-                                  <a:rPr lang="en-US" i="1"/>
+                                  <a:rPr lang="en-US" i="1">
+                                    <a:latin typeface="Cambria Math"/>
+                                  </a:rPr>
                                   <m:t>40</m:t>
                                 </m:r>
                               </m:e>
                               <m:e>
                                 <m:r>
-                                  <a:rPr lang="en-US" i="1"/>
+                                  <a:rPr lang="en-US" i="1">
+                                    <a:latin typeface="Cambria Math"/>
+                                  </a:rPr>
                                   <m:t>0</m:t>
                                 </m:r>
                               </m:e>
                               <m:e>
                                 <m:r>
-                                  <a:rPr lang="en-US" i="1"/>
+                                  <a:rPr lang="en-US" i="1">
+                                    <a:latin typeface="Cambria Math"/>
+                                  </a:rPr>
                                   <m:t>0</m:t>
                                 </m:r>
                               </m:e>
@@ -10139,37 +10397,49 @@
                             <m:mr>
                               <m:e>
                                 <m:r>
-                                  <a:rPr lang="en-US" i="1"/>
+                                  <a:rPr lang="en-US" i="1">
+                                    <a:latin typeface="Cambria Math"/>
+                                  </a:rPr>
                                   <m:t>0</m:t>
                                 </m:r>
                               </m:e>
                               <m:e>
                                 <m:r>
-                                  <a:rPr lang="en-US" i="1"/>
+                                  <a:rPr lang="en-US" i="1">
+                                    <a:latin typeface="Cambria Math"/>
+                                  </a:rPr>
                                   <m:t>0</m:t>
                                 </m:r>
                               </m:e>
                               <m:e>
                                 <m:r>
-                                  <a:rPr lang="en-US" i="1"/>
+                                  <a:rPr lang="en-US" i="1">
+                                    <a:latin typeface="Cambria Math"/>
+                                  </a:rPr>
                                   <m:t>50</m:t>
                                 </m:r>
                               </m:e>
                               <m:e>
                                 <m:r>
-                                  <a:rPr lang="en-US" i="1"/>
+                                  <a:rPr lang="en-US" i="1">
+                                    <a:latin typeface="Cambria Math"/>
+                                  </a:rPr>
                                   <m:t>60</m:t>
                                 </m:r>
                               </m:e>
                               <m:e>
                                 <m:r>
-                                  <a:rPr lang="en-US" i="1"/>
+                                  <a:rPr lang="en-US" i="1">
+                                    <a:latin typeface="Cambria Math"/>
+                                  </a:rPr>
                                   <m:t>70</m:t>
                                 </m:r>
                               </m:e>
                               <m:e>
                                 <m:r>
-                                  <a:rPr lang="en-US" i="1"/>
+                                  <a:rPr lang="en-US" i="1">
+                                    <a:latin typeface="Cambria Math"/>
+                                  </a:rPr>
                                   <m:t>0</m:t>
                                 </m:r>
                               </m:e>
@@ -10177,37 +10447,49 @@
                             <m:mr>
                               <m:e>
                                 <m:r>
-                                  <a:rPr lang="en-US" i="1"/>
+                                  <a:rPr lang="en-US" i="1">
+                                    <a:latin typeface="Cambria Math"/>
+                                  </a:rPr>
                                   <m:t>0</m:t>
                                 </m:r>
                               </m:e>
                               <m:e>
                                 <m:r>
-                                  <a:rPr lang="en-US" i="1"/>
+                                  <a:rPr lang="en-US" i="1">
+                                    <a:latin typeface="Cambria Math"/>
+                                  </a:rPr>
                                   <m:t>0</m:t>
                                 </m:r>
                               </m:e>
                               <m:e>
                                 <m:r>
-                                  <a:rPr lang="en-US" i="1"/>
+                                  <a:rPr lang="en-US" i="1">
+                                    <a:latin typeface="Cambria Math"/>
+                                  </a:rPr>
                                   <m:t>0</m:t>
                                 </m:r>
                               </m:e>
                               <m:e>
                                 <m:r>
-                                  <a:rPr lang="en-US" i="1"/>
+                                  <a:rPr lang="en-US" i="1">
+                                    <a:latin typeface="Cambria Math"/>
+                                  </a:rPr>
                                   <m:t>0</m:t>
                                 </m:r>
                               </m:e>
                               <m:e>
                                 <m:r>
-                                  <a:rPr lang="en-US" i="1"/>
+                                  <a:rPr lang="en-US" i="1">
+                                    <a:latin typeface="Cambria Math"/>
+                                  </a:rPr>
                                   <m:t>0</m:t>
                                 </m:r>
                               </m:e>
                               <m:e>
                                 <m:r>
-                                  <a:rPr lang="en-US" i="1"/>
+                                  <a:rPr lang="en-US" i="1">
+                                    <a:latin typeface="Cambria Math"/>
+                                  </a:rPr>
                                   <m:t>80</m:t>
                                 </m:r>
                               </m:e>
@@ -10325,7 +10607,7 @@
             </p:txBody>
           </p:sp>
         </mc:Choice>
-        <mc:Fallback>
+        <mc:Fallback xmlns="">
           <p:sp>
             <p:nvSpPr>
               <p:cNvPr id="7" name="TextBox 6"/>

</xml_diff>